<commit_message>
Report updated. Matlab file to extract graphs updated.
</commit_message>
<xml_diff>
--- a/Report/Images/Proposed System/Camera Panning Configuration.pptx
+++ b/Report/Images/Proposed System/Camera Panning Configuration.pptx
@@ -197,7 +197,7 @@
           <a:p>
             <a:fld id="{172E4BCF-EDA8-3944-BC75-6E14331D3E00}" type="datetimeFigureOut">
               <a:rPr lang="es-ES_tradnl" smtClean="0"/>
-              <a:t>20/5/17</a:t>
+              <a:t>23/6/17</a:t>
             </a:fld>
             <a:endParaRPr lang="es-ES_tradnl"/>
           </a:p>
@@ -685,7 +685,7 @@
           <a:p>
             <a:fld id="{C61053CC-8888-F748-BB3C-0CD1987ECE71}" type="datetimeFigureOut">
               <a:rPr lang="es-ES_tradnl" smtClean="0"/>
-              <a:t>20/5/17</a:t>
+              <a:t>23/6/17</a:t>
             </a:fld>
             <a:endParaRPr lang="es-ES_tradnl"/>
           </a:p>
@@ -850,7 +850,7 @@
           <a:p>
             <a:fld id="{C61053CC-8888-F748-BB3C-0CD1987ECE71}" type="datetimeFigureOut">
               <a:rPr lang="es-ES_tradnl" smtClean="0"/>
-              <a:t>20/5/17</a:t>
+              <a:t>23/6/17</a:t>
             </a:fld>
             <a:endParaRPr lang="es-ES_tradnl"/>
           </a:p>
@@ -1025,7 +1025,7 @@
           <a:p>
             <a:fld id="{C61053CC-8888-F748-BB3C-0CD1987ECE71}" type="datetimeFigureOut">
               <a:rPr lang="es-ES_tradnl" smtClean="0"/>
-              <a:t>20/5/17</a:t>
+              <a:t>23/6/17</a:t>
             </a:fld>
             <a:endParaRPr lang="es-ES_tradnl"/>
           </a:p>
@@ -1190,7 +1190,7 @@
           <a:p>
             <a:fld id="{C61053CC-8888-F748-BB3C-0CD1987ECE71}" type="datetimeFigureOut">
               <a:rPr lang="es-ES_tradnl" smtClean="0"/>
-              <a:t>20/5/17</a:t>
+              <a:t>23/6/17</a:t>
             </a:fld>
             <a:endParaRPr lang="es-ES_tradnl"/>
           </a:p>
@@ -1431,7 +1431,7 @@
           <a:p>
             <a:fld id="{C61053CC-8888-F748-BB3C-0CD1987ECE71}" type="datetimeFigureOut">
               <a:rPr lang="es-ES_tradnl" smtClean="0"/>
-              <a:t>20/5/17</a:t>
+              <a:t>23/6/17</a:t>
             </a:fld>
             <a:endParaRPr lang="es-ES_tradnl"/>
           </a:p>
@@ -1658,7 +1658,7 @@
           <a:p>
             <a:fld id="{C61053CC-8888-F748-BB3C-0CD1987ECE71}" type="datetimeFigureOut">
               <a:rPr lang="es-ES_tradnl" smtClean="0"/>
-              <a:t>20/5/17</a:t>
+              <a:t>23/6/17</a:t>
             </a:fld>
             <a:endParaRPr lang="es-ES_tradnl"/>
           </a:p>
@@ -2020,7 +2020,7 @@
           <a:p>
             <a:fld id="{C61053CC-8888-F748-BB3C-0CD1987ECE71}" type="datetimeFigureOut">
               <a:rPr lang="es-ES_tradnl" smtClean="0"/>
-              <a:t>20/5/17</a:t>
+              <a:t>23/6/17</a:t>
             </a:fld>
             <a:endParaRPr lang="es-ES_tradnl"/>
           </a:p>
@@ -2133,7 +2133,7 @@
           <a:p>
             <a:fld id="{C61053CC-8888-F748-BB3C-0CD1987ECE71}" type="datetimeFigureOut">
               <a:rPr lang="es-ES_tradnl" smtClean="0"/>
-              <a:t>20/5/17</a:t>
+              <a:t>23/6/17</a:t>
             </a:fld>
             <a:endParaRPr lang="es-ES_tradnl"/>
           </a:p>
@@ -2223,7 +2223,7 @@
           <a:p>
             <a:fld id="{C61053CC-8888-F748-BB3C-0CD1987ECE71}" type="datetimeFigureOut">
               <a:rPr lang="es-ES_tradnl" smtClean="0"/>
-              <a:t>20/5/17</a:t>
+              <a:t>23/6/17</a:t>
             </a:fld>
             <a:endParaRPr lang="es-ES_tradnl"/>
           </a:p>
@@ -2495,7 +2495,7 @@
           <a:p>
             <a:fld id="{C61053CC-8888-F748-BB3C-0CD1987ECE71}" type="datetimeFigureOut">
               <a:rPr lang="es-ES_tradnl" smtClean="0"/>
-              <a:t>20/5/17</a:t>
+              <a:t>23/6/17</a:t>
             </a:fld>
             <a:endParaRPr lang="es-ES_tradnl"/>
           </a:p>
@@ -2747,7 +2747,7 @@
           <a:p>
             <a:fld id="{C61053CC-8888-F748-BB3C-0CD1987ECE71}" type="datetimeFigureOut">
               <a:rPr lang="es-ES_tradnl" smtClean="0"/>
-              <a:t>20/5/17</a:t>
+              <a:t>23/6/17</a:t>
             </a:fld>
             <a:endParaRPr lang="es-ES_tradnl"/>
           </a:p>
@@ -2955,7 +2955,7 @@
           <a:p>
             <a:fld id="{C61053CC-8888-F748-BB3C-0CD1987ECE71}" type="datetimeFigureOut">
               <a:rPr lang="es-ES_tradnl" smtClean="0"/>
-              <a:t>20/5/17</a:t>
+              <a:t>23/6/17</a:t>
             </a:fld>
             <a:endParaRPr lang="es-ES_tradnl"/>
           </a:p>
@@ -4147,7 +4147,7 @@
               </a:pathLst>
             </a:custGeom>
             <a:noFill/>
-            <a:ln>
+            <a:ln w="19050">
               <a:solidFill>
                 <a:srgbClr val="00B050"/>
               </a:solidFill>
@@ -4499,7 +4499,7 @@
               </a:pathLst>
             </a:custGeom>
             <a:noFill/>
-            <a:ln>
+            <a:ln w="19050">
               <a:solidFill>
                 <a:srgbClr val="FF0000"/>
               </a:solidFill>
@@ -4849,7 +4849,7 @@
               </a:pathLst>
             </a:custGeom>
             <a:noFill/>
-            <a:ln>
+            <a:ln w="19050">
               <a:solidFill>
                 <a:schemeClr val="accent1"/>
               </a:solidFill>
@@ -5350,10 +5350,10 @@
         </p:nvGrpSpPr>
         <p:grpSpPr>
           <a:xfrm>
-            <a:off x="6806005" y="8590433"/>
-            <a:ext cx="4610011" cy="1244536"/>
-            <a:chOff x="6806005" y="8590433"/>
-            <a:chExt cx="4610011" cy="1244536"/>
+            <a:off x="7123360" y="8641050"/>
+            <a:ext cx="3917578" cy="1296120"/>
+            <a:chOff x="7123360" y="8538849"/>
+            <a:chExt cx="3917578" cy="1296120"/>
           </a:xfrm>
         </p:grpSpPr>
         <p:pic>
@@ -5378,8 +5378,8 @@
           </p:blipFill>
           <p:spPr>
             <a:xfrm>
-              <a:off x="6806005" y="8636286"/>
-              <a:ext cx="900000" cy="675000"/>
+              <a:off x="7123360" y="8538849"/>
+              <a:ext cx="1338725" cy="1004044"/>
             </a:xfrm>
             <a:prstGeom prst="rect">
               <a:avLst/>
@@ -5388,7 +5388,7 @@
         </p:pic>
         <p:pic>
           <p:nvPicPr>
-            <p:cNvPr id="118" name="Picture 117"/>
+            <p:cNvPr id="120" name="Picture 119"/>
             <p:cNvPicPr>
               <a:picLocks noChangeAspect="1"/>
             </p:cNvPicPr>
@@ -5408,68 +5408,8 @@
           </p:blipFill>
           <p:spPr>
             <a:xfrm>
-              <a:off x="7840386" y="8636286"/>
-              <a:ext cx="900000" cy="675000"/>
-            </a:xfrm>
-            <a:prstGeom prst="rect">
-              <a:avLst/>
-            </a:prstGeom>
-          </p:spPr>
-        </p:pic>
-        <p:pic>
-          <p:nvPicPr>
-            <p:cNvPr id="119" name="Picture 118"/>
-            <p:cNvPicPr>
-              <a:picLocks noChangeAspect="1"/>
-            </p:cNvPicPr>
-            <p:nvPr/>
-          </p:nvPicPr>
-          <p:blipFill>
-            <a:blip r:embed="rId5">
-              <a:extLst>
-                <a:ext uri="{28A0092B-C50C-407E-A947-70E740481C1C}">
-                  <a14:useLocalDpi xmlns:a14="http://schemas.microsoft.com/office/drawing/2010/main" val="0"/>
-                </a:ext>
-              </a:extLst>
-            </a:blip>
-            <a:stretch>
-              <a:fillRect/>
-            </a:stretch>
-          </p:blipFill>
-          <p:spPr>
-            <a:xfrm>
-              <a:off x="9441282" y="8647584"/>
-              <a:ext cx="900000" cy="675000"/>
-            </a:xfrm>
-            <a:prstGeom prst="rect">
-              <a:avLst/>
-            </a:prstGeom>
-          </p:spPr>
-        </p:pic>
-        <p:pic>
-          <p:nvPicPr>
-            <p:cNvPr id="120" name="Picture 119"/>
-            <p:cNvPicPr>
-              <a:picLocks noChangeAspect="1"/>
-            </p:cNvPicPr>
-            <p:nvPr/>
-          </p:nvPicPr>
-          <p:blipFill>
-            <a:blip r:embed="rId6">
-              <a:extLst>
-                <a:ext uri="{28A0092B-C50C-407E-A947-70E740481C1C}">
-                  <a14:useLocalDpi xmlns:a14="http://schemas.microsoft.com/office/drawing/2010/main" val="0"/>
-                </a:ext>
-              </a:extLst>
-            </a:blip>
-            <a:stretch>
-              <a:fillRect/>
-            </a:stretch>
-          </p:blipFill>
-          <p:spPr>
-            <a:xfrm>
-              <a:off x="10516016" y="8647584"/>
-              <a:ext cx="900000" cy="675000"/>
+              <a:off x="9702213" y="8571164"/>
+              <a:ext cx="1338725" cy="1004044"/>
             </a:xfrm>
             <a:prstGeom prst="rect">
               <a:avLst/>
@@ -5484,7 +5424,7 @@
           </p:nvSpPr>
           <p:spPr>
             <a:xfrm>
-              <a:off x="8771857" y="8590433"/>
+              <a:off x="8763172" y="8682676"/>
               <a:ext cx="637954" cy="511037"/>
             </a:xfrm>
             <a:prstGeom prst="rect">
@@ -5548,8 +5488,8 @@
           </p:nvCxnSpPr>
           <p:spPr>
             <a:xfrm flipH="1">
-              <a:off x="6806005" y="9634914"/>
-              <a:ext cx="1764007" cy="0"/>
+              <a:off x="7123360" y="9634914"/>
+              <a:ext cx="1446652" cy="0"/>
             </a:xfrm>
             <a:prstGeom prst="straightConnector1">
               <a:avLst/>
@@ -5587,7 +5527,7 @@
           <p:spPr>
             <a:xfrm>
               <a:off x="9594286" y="9634914"/>
-              <a:ext cx="1808748" cy="0"/>
+              <a:ext cx="1446652" cy="0"/>
             </a:xfrm>
             <a:prstGeom prst="straightConnector1">
               <a:avLst/>
@@ -5623,10 +5563,10 @@
         </p:nvGrpSpPr>
         <p:grpSpPr>
           <a:xfrm>
-            <a:off x="13079472" y="5064869"/>
-            <a:ext cx="4608373" cy="1244536"/>
-            <a:chOff x="13079472" y="5064869"/>
-            <a:chExt cx="4608373" cy="1244536"/>
+            <a:off x="13094992" y="4942892"/>
+            <a:ext cx="3378526" cy="1367338"/>
+            <a:chOff x="13094992" y="4942892"/>
+            <a:chExt cx="3378526" cy="1367338"/>
           </a:xfrm>
         </p:grpSpPr>
         <p:sp>
@@ -5637,7 +5577,7 @@
           </p:nvSpPr>
           <p:spPr>
             <a:xfrm>
-              <a:off x="15045324" y="5064869"/>
+              <a:off x="14338083" y="5161251"/>
               <a:ext cx="637954" cy="511037"/>
             </a:xfrm>
             <a:prstGeom prst="rect">
@@ -5668,7 +5608,7 @@
           </p:nvSpPr>
           <p:spPr>
             <a:xfrm>
-              <a:off x="14843479" y="5909295"/>
+              <a:off x="14259288" y="5910120"/>
               <a:ext cx="1024274" cy="400110"/>
             </a:xfrm>
             <a:prstGeom prst="rect">
@@ -5694,13 +5634,15 @@
         <p:cxnSp>
           <p:nvCxnSpPr>
             <p:cNvPr id="134" name="Straight Arrow Connector 133"/>
-            <p:cNvCxnSpPr/>
+            <p:cNvCxnSpPr>
+              <a:stCxn id="133" idx="1"/>
+            </p:cNvCxnSpPr>
             <p:nvPr/>
           </p:nvCxnSpPr>
           <p:spPr>
-            <a:xfrm flipH="1">
-              <a:off x="13079472" y="6109350"/>
-              <a:ext cx="1764007" cy="0"/>
+            <a:xfrm flipH="1" flipV="1">
+              <a:off x="13094992" y="6107463"/>
+              <a:ext cx="1164296" cy="2712"/>
             </a:xfrm>
             <a:prstGeom prst="straightConnector1">
               <a:avLst/>
@@ -5730,13 +5672,15 @@
         <p:cxnSp>
           <p:nvCxnSpPr>
             <p:cNvPr id="135" name="Straight Arrow Connector 134"/>
-            <p:cNvCxnSpPr/>
+            <p:cNvCxnSpPr>
+              <a:stCxn id="133" idx="3"/>
+            </p:cNvCxnSpPr>
             <p:nvPr/>
           </p:nvCxnSpPr>
           <p:spPr>
-            <a:xfrm>
-              <a:off x="15867753" y="6109350"/>
-              <a:ext cx="1808748" cy="0"/>
+            <a:xfrm flipV="1">
+              <a:off x="15283562" y="6107463"/>
+              <a:ext cx="1189956" cy="2712"/>
             </a:xfrm>
             <a:prstGeom prst="straightConnector1">
               <a:avLst/>
@@ -5772,7 +5716,7 @@
             <p:nvPr/>
           </p:nvPicPr>
           <p:blipFill>
-            <a:blip r:embed="rId7">
+            <a:blip r:embed="rId5">
               <a:extLst>
                 <a:ext uri="{28A0092B-C50C-407E-A947-70E740481C1C}">
                   <a14:useLocalDpi xmlns:a14="http://schemas.microsoft.com/office/drawing/2010/main" val="0"/>
@@ -5785,68 +5729,8 @@
           </p:blipFill>
           <p:spPr>
             <a:xfrm>
-              <a:off x="13079472" y="5122020"/>
-              <a:ext cx="900000" cy="675000"/>
-            </a:xfrm>
-            <a:prstGeom prst="rect">
-              <a:avLst/>
-            </a:prstGeom>
-          </p:spPr>
-        </p:pic>
-        <p:pic>
-          <p:nvPicPr>
-            <p:cNvPr id="151" name="Picture 150"/>
-            <p:cNvPicPr>
-              <a:picLocks noChangeAspect="1"/>
-            </p:cNvPicPr>
-            <p:nvPr/>
-          </p:nvPicPr>
-          <p:blipFill>
-            <a:blip r:embed="rId8">
-              <a:extLst>
-                <a:ext uri="{28A0092B-C50C-407E-A947-70E740481C1C}">
-                  <a14:useLocalDpi xmlns:a14="http://schemas.microsoft.com/office/drawing/2010/main" val="0"/>
-                </a:ext>
-              </a:extLst>
-            </a:blip>
-            <a:stretch>
-              <a:fillRect/>
-            </a:stretch>
-          </p:blipFill>
-          <p:spPr>
-            <a:xfrm>
-              <a:off x="14117915" y="5122020"/>
-              <a:ext cx="900000" cy="675000"/>
-            </a:xfrm>
-            <a:prstGeom prst="rect">
-              <a:avLst/>
-            </a:prstGeom>
-          </p:spPr>
-        </p:pic>
-        <p:pic>
-          <p:nvPicPr>
-            <p:cNvPr id="152" name="Picture 151"/>
-            <p:cNvPicPr>
-              <a:picLocks noChangeAspect="1"/>
-            </p:cNvPicPr>
-            <p:nvPr/>
-          </p:nvPicPr>
-          <p:blipFill>
-            <a:blip r:embed="rId9">
-              <a:extLst>
-                <a:ext uri="{28A0092B-C50C-407E-A947-70E740481C1C}">
-                  <a14:useLocalDpi xmlns:a14="http://schemas.microsoft.com/office/drawing/2010/main" val="0"/>
-                </a:ext>
-              </a:extLst>
-            </a:blip>
-            <a:stretch>
-              <a:fillRect/>
-            </a:stretch>
-          </p:blipFill>
-          <p:spPr>
-            <a:xfrm>
-              <a:off x="15714749" y="5122020"/>
-              <a:ext cx="900000" cy="675000"/>
+              <a:off x="13094992" y="4942893"/>
+              <a:ext cx="1325497" cy="994123"/>
             </a:xfrm>
             <a:prstGeom prst="rect">
               <a:avLst/>
@@ -5862,7 +5746,7 @@
             <p:nvPr/>
           </p:nvPicPr>
           <p:blipFill>
-            <a:blip r:embed="rId10">
+            <a:blip r:embed="rId6">
               <a:extLst>
                 <a:ext uri="{28A0092B-C50C-407E-A947-70E740481C1C}">
                   <a14:useLocalDpi xmlns:a14="http://schemas.microsoft.com/office/drawing/2010/main" val="0"/>
@@ -5875,8 +5759,8 @@
           </p:blipFill>
           <p:spPr>
             <a:xfrm>
-              <a:off x="16787845" y="5122020"/>
-              <a:ext cx="900000" cy="675000"/>
+              <a:off x="15148021" y="4942892"/>
+              <a:ext cx="1325497" cy="994123"/>
             </a:xfrm>
             <a:prstGeom prst="rect">
               <a:avLst/>
@@ -5892,10 +5776,10 @@
         </p:nvGrpSpPr>
         <p:grpSpPr>
           <a:xfrm>
-            <a:off x="217008" y="5064869"/>
-            <a:ext cx="4610011" cy="1244536"/>
-            <a:chOff x="217008" y="5064869"/>
-            <a:chExt cx="4610011" cy="1244536"/>
+            <a:off x="1588982" y="4990053"/>
+            <a:ext cx="3332294" cy="1334200"/>
+            <a:chOff x="1590266" y="4962332"/>
+            <a:chExt cx="3332294" cy="1334200"/>
           </a:xfrm>
         </p:grpSpPr>
         <p:sp>
@@ -5906,7 +5790,7 @@
           </p:nvSpPr>
           <p:spPr>
             <a:xfrm>
-              <a:off x="2193834" y="5064869"/>
+              <a:off x="2958571" y="5216300"/>
               <a:ext cx="637954" cy="511037"/>
             </a:xfrm>
             <a:prstGeom prst="rect">
@@ -5922,7 +5806,7 @@
             <a:p>
               <a:pPr algn="ctr"/>
               <a:r>
-                <a:rPr lang="mr-IN" smtClean="0"/>
+                <a:rPr lang="mr-IN" dirty="0" smtClean="0"/>
                 <a:t>…</a:t>
               </a:r>
               <a:endParaRPr lang="es-ES_tradnl" dirty="0"/>
@@ -5937,7 +5821,7 @@
           </p:nvSpPr>
           <p:spPr>
             <a:xfrm>
-              <a:off x="1991989" y="5909295"/>
+              <a:off x="2767062" y="5896422"/>
               <a:ext cx="1024274" cy="400110"/>
             </a:xfrm>
             <a:prstGeom prst="rect">
@@ -5963,13 +5847,15 @@
         <p:cxnSp>
           <p:nvCxnSpPr>
             <p:cNvPr id="142" name="Straight Arrow Connector 141"/>
-            <p:cNvCxnSpPr/>
+            <p:cNvCxnSpPr>
+              <a:stCxn id="141" idx="1"/>
+            </p:cNvCxnSpPr>
             <p:nvPr/>
           </p:nvCxnSpPr>
           <p:spPr>
-            <a:xfrm flipH="1">
-              <a:off x="227982" y="6109350"/>
-              <a:ext cx="1764007" cy="0"/>
+            <a:xfrm flipH="1" flipV="1">
+              <a:off x="1590266" y="6094492"/>
+              <a:ext cx="1176796" cy="1985"/>
             </a:xfrm>
             <a:prstGeom prst="straightConnector1">
               <a:avLst/>
@@ -5999,13 +5885,15 @@
         <p:cxnSp>
           <p:nvCxnSpPr>
             <p:cNvPr id="143" name="Straight Arrow Connector 142"/>
-            <p:cNvCxnSpPr/>
+            <p:cNvCxnSpPr>
+              <a:stCxn id="141" idx="3"/>
+            </p:cNvCxnSpPr>
             <p:nvPr/>
           </p:nvCxnSpPr>
           <p:spPr>
             <a:xfrm>
-              <a:off x="3016263" y="6109350"/>
-              <a:ext cx="1808748" cy="0"/>
+              <a:off x="3791336" y="6096477"/>
+              <a:ext cx="1112646" cy="0"/>
             </a:xfrm>
             <a:prstGeom prst="straightConnector1">
               <a:avLst/>
@@ -6041,7 +5929,7 @@
             <p:nvPr/>
           </p:nvPicPr>
           <p:blipFill>
-            <a:blip r:embed="rId11">
+            <a:blip r:embed="rId7">
               <a:extLst>
                 <a:ext uri="{28A0092B-C50C-407E-A947-70E740481C1C}">
                   <a14:useLocalDpi xmlns:a14="http://schemas.microsoft.com/office/drawing/2010/main" val="0"/>
@@ -6054,68 +5942,8 @@
           </p:blipFill>
           <p:spPr>
             <a:xfrm>
-              <a:off x="217008" y="5126452"/>
-              <a:ext cx="900000" cy="675000"/>
-            </a:xfrm>
-            <a:prstGeom prst="rect">
-              <a:avLst/>
-            </a:prstGeom>
-          </p:spPr>
-        </p:pic>
-        <p:pic>
-          <p:nvPicPr>
-            <p:cNvPr id="155" name="Picture 154"/>
-            <p:cNvPicPr>
-              <a:picLocks noChangeAspect="1"/>
-            </p:cNvPicPr>
-            <p:nvPr/>
-          </p:nvPicPr>
-          <p:blipFill>
-            <a:blip r:embed="rId12">
-              <a:extLst>
-                <a:ext uri="{28A0092B-C50C-407E-A947-70E740481C1C}">
-                  <a14:useLocalDpi xmlns:a14="http://schemas.microsoft.com/office/drawing/2010/main" val="0"/>
-                </a:ext>
-              </a:extLst>
-            </a:blip>
-            <a:stretch>
-              <a:fillRect/>
-            </a:stretch>
-          </p:blipFill>
-          <p:spPr>
-            <a:xfrm>
-              <a:off x="1251389" y="5121946"/>
-              <a:ext cx="900000" cy="675000"/>
-            </a:xfrm>
-            <a:prstGeom prst="rect">
-              <a:avLst/>
-            </a:prstGeom>
-          </p:spPr>
-        </p:pic>
-        <p:pic>
-          <p:nvPicPr>
-            <p:cNvPr id="156" name="Picture 155"/>
-            <p:cNvPicPr>
-              <a:picLocks noChangeAspect="1"/>
-            </p:cNvPicPr>
-            <p:nvPr/>
-          </p:nvPicPr>
-          <p:blipFill>
-            <a:blip r:embed="rId13">
-              <a:extLst>
-                <a:ext uri="{28A0092B-C50C-407E-A947-70E740481C1C}">
-                  <a14:useLocalDpi xmlns:a14="http://schemas.microsoft.com/office/drawing/2010/main" val="0"/>
-                </a:ext>
-              </a:extLst>
-            </a:blip>
-            <a:stretch>
-              <a:fillRect/>
-            </a:stretch>
-          </p:blipFill>
-          <p:spPr>
-            <a:xfrm>
-              <a:off x="2852285" y="5121946"/>
-              <a:ext cx="900000" cy="675000"/>
+              <a:off x="1590266" y="4962332"/>
+              <a:ext cx="1284100" cy="963075"/>
             </a:xfrm>
             <a:prstGeom prst="rect">
               <a:avLst/>
@@ -6131,7 +5959,7 @@
             <p:nvPr/>
           </p:nvPicPr>
           <p:blipFill>
-            <a:blip r:embed="rId14">
+            <a:blip r:embed="rId8">
               <a:extLst>
                 <a:ext uri="{28A0092B-C50C-407E-A947-70E740481C1C}">
                   <a14:useLocalDpi xmlns:a14="http://schemas.microsoft.com/office/drawing/2010/main" val="0"/>
@@ -6144,8 +5972,8 @@
           </p:blipFill>
           <p:spPr>
             <a:xfrm>
-              <a:off x="3927019" y="5121946"/>
-              <a:ext cx="900000" cy="675000"/>
+              <a:off x="3623403" y="4972336"/>
+              <a:ext cx="1299157" cy="974368"/>
             </a:xfrm>
             <a:prstGeom prst="rect">
               <a:avLst/>

</xml_diff>